<commit_message>
code clean up and presentation touch up
</commit_message>
<xml_diff>
--- a/noLimit (Team-2).pptx
+++ b/noLimit (Team-2).pptx
@@ -5828,21 +5828,13 @@
           <a:p>
             <a:r>
               <a:rPr lang="en-US" dirty="0" smtClean="0"/>
-              <a:t>Monique </a:t>
-            </a:r>
+              <a:t>Monique Shotande </a:t>
+            </a:r>
+          </a:p>
+          <a:p>
             <a:r>
               <a:rPr lang="en-US" dirty="0" smtClean="0"/>
-              <a:t>Shotande </a:t>
-            </a:r>
-          </a:p>
-          <a:p>
-            <a:r>
-              <a:rPr lang="en-US" dirty="0" smtClean="0"/>
-              <a:t>Michael </a:t>
-            </a:r>
-            <a:r>
-              <a:rPr lang="en-US" dirty="0" smtClean="0"/>
-              <a:t>Dennis</a:t>
+              <a:t>Michael Dennis</a:t>
             </a:r>
           </a:p>
           <a:p>
@@ -5920,7 +5912,7 @@
           <a:p>
             <a:r>
               <a:rPr lang="en-US" dirty="0" smtClean="0"/>
-              <a:t>Motivation</a:t>
+              <a:t>Motivation &amp; Overview</a:t>
             </a:r>
             <a:endParaRPr lang="en-US" dirty="0"/>
           </a:p>
@@ -5961,14 +5953,12 @@
               <a:rPr lang="en-US" sz="2800" dirty="0" smtClean="0"/>
               <a:t>Assist individuals with disabilities</a:t>
             </a:r>
-            <a:endParaRPr lang="en-US" sz="2800" dirty="0" smtClean="0"/>
           </a:p>
           <a:p>
             <a:r>
               <a:rPr lang="en-US" sz="2800" dirty="0" smtClean="0"/>
               <a:t>Encourage individuals volunteer</a:t>
             </a:r>
-            <a:endParaRPr lang="en-US" sz="2800" dirty="0" smtClean="0"/>
           </a:p>
         </p:txBody>
       </p:sp>
@@ -6042,16 +6032,15 @@
             <p:ph idx="1"/>
           </p:nvPr>
         </p:nvPicPr>
-        <p:blipFill>
+        <p:blipFill rotWithShape="1">
           <a:blip r:embed="rId2"/>
-          <a:stretch>
-            <a:fillRect/>
-          </a:stretch>
+          <a:srcRect l="2662" t="13766"/>
+          <a:stretch/>
         </p:blipFill>
         <p:spPr>
           <a:xfrm>
-            <a:off x="1806224" y="1664785"/>
-            <a:ext cx="9011002" cy="5066215"/>
+            <a:off x="754018" y="1739900"/>
+            <a:ext cx="9994990" cy="4978400"/>
           </a:xfrm>
           <a:prstGeom prst="rect">
             <a:avLst/>
@@ -6118,25 +6107,6 @@
           </a:p>
         </p:txBody>
       </p:sp>
-      <p:sp>
-        <p:nvSpPr>
-          <p:cNvPr id="4" name="Content Placeholder 3"/>
-          <p:cNvSpPr>
-            <a:spLocks noGrp="1"/>
-          </p:cNvSpPr>
-          <p:nvPr>
-            <p:ph idx="1"/>
-          </p:nvPr>
-        </p:nvSpPr>
-        <p:spPr/>
-        <p:txBody>
-          <a:bodyPr/>
-          <a:lstStyle/>
-          <a:p>
-            <a:endParaRPr lang="en-US"/>
-          </a:p>
-        </p:txBody>
-      </p:sp>
       <p:pic>
         <p:nvPicPr>
           <p:cNvPr id="6" name="Picture 5"/>
@@ -6145,16 +6115,15 @@
           </p:cNvPicPr>
           <p:nvPr/>
         </p:nvPicPr>
-        <p:blipFill>
+        <p:blipFill rotWithShape="1">
           <a:blip r:embed="rId2"/>
-          <a:stretch>
-            <a:fillRect/>
-          </a:stretch>
+          <a:srcRect l="3979" t="14541" b="10968"/>
+          <a:stretch/>
         </p:blipFill>
         <p:spPr>
           <a:xfrm>
-            <a:off x="1228993" y="1752600"/>
-            <a:ext cx="8854808" cy="4978399"/>
+            <a:off x="545559" y="1816100"/>
+            <a:ext cx="11084330" cy="4834467"/>
           </a:xfrm>
           <a:prstGeom prst="rect">
             <a:avLst/>
@@ -6221,25 +6190,29 @@
           </a:p>
         </p:txBody>
       </p:sp>
-      <p:sp>
-        <p:nvSpPr>
-          <p:cNvPr id="4" name="Content Placeholder 3"/>
-          <p:cNvSpPr>
-            <a:spLocks noGrp="1"/>
-          </p:cNvSpPr>
-          <p:nvPr>
-            <p:ph idx="1"/>
-          </p:nvPr>
-        </p:nvSpPr>
-        <p:spPr/>
-        <p:txBody>
-          <a:bodyPr/>
-          <a:lstStyle/>
-          <a:p>
-            <a:endParaRPr lang="en-US"/>
-          </a:p>
-        </p:txBody>
-      </p:sp>
+      <p:pic>
+        <p:nvPicPr>
+          <p:cNvPr id="3" name="Picture 2"/>
+          <p:cNvPicPr>
+            <a:picLocks noChangeAspect="1"/>
+          </p:cNvPicPr>
+          <p:nvPr/>
+        </p:nvPicPr>
+        <p:blipFill rotWithShape="1">
+          <a:blip r:embed="rId2"/>
+          <a:srcRect l="6397" t="13726" r="5348" b="7912"/>
+          <a:stretch/>
+        </p:blipFill>
+        <p:spPr>
+          <a:xfrm>
+            <a:off x="731263" y="1727201"/>
+            <a:ext cx="10040499" cy="5012268"/>
+          </a:xfrm>
+          <a:prstGeom prst="rect">
+            <a:avLst/>
+          </a:prstGeom>
+        </p:spPr>
+      </p:pic>
     </p:spTree>
     <p:extLst>
       <p:ext uri="{BB962C8B-B14F-4D97-AF65-F5344CB8AC3E}">
@@ -6302,13 +6275,11 @@
       </p:sp>
       <p:pic>
         <p:nvPicPr>
-          <p:cNvPr id="3" name="Content Placeholder 2"/>
+          <p:cNvPr id="4" name="Picture 3"/>
           <p:cNvPicPr>
-            <a:picLocks noGrp="1" noChangeAspect="1"/>
+            <a:picLocks noChangeAspect="1"/>
           </p:cNvPicPr>
-          <p:nvPr>
-            <p:ph idx="1"/>
-          </p:nvPr>
+          <p:nvPr/>
         </p:nvPicPr>
         <p:blipFill>
           <a:blip r:embed="rId2"/>
@@ -6318,8 +6289,8 @@
         </p:blipFill>
         <p:spPr>
           <a:xfrm>
-            <a:off x="1806224" y="1664785"/>
-            <a:ext cx="9011002" cy="5066215"/>
+            <a:off x="2482675" y="1567554"/>
+            <a:ext cx="6610525" cy="5163445"/>
           </a:xfrm>
           <a:prstGeom prst="rect">
             <a:avLst/>
@@ -6409,18 +6380,26 @@
             </a:r>
           </a:p>
           <a:p>
-            <a:r>
-              <a:rPr lang="en-US" sz="3200" dirty="0" err="1" smtClean="0"/>
+            <a:pPr lvl="1"/>
+            <a:r>
+              <a:rPr lang="en-US" sz="3000" dirty="0" err="1" smtClean="0"/>
               <a:t>MeteorJs</a:t>
             </a:r>
-            <a:endParaRPr lang="en-US" sz="3200" dirty="0" smtClean="0"/>
+            <a:r>
+              <a:rPr lang="en-US" sz="3000" dirty="0" smtClean="0"/>
+              <a:t> + Bootstrap</a:t>
+            </a:r>
+            <a:endParaRPr lang="en-US" sz="3000" dirty="0" smtClean="0"/>
           </a:p>
           <a:p>
             <a:r>
               <a:rPr lang="en-US" sz="3200" dirty="0" smtClean="0"/>
-              <a:t>Location, Location, Location</a:t>
-            </a:r>
-            <a:endParaRPr lang="en-US" sz="3200" dirty="0"/>
+              <a:t>Location, Location, </a:t>
+            </a:r>
+            <a:r>
+              <a:rPr lang="en-US" sz="3200" dirty="0" smtClean="0"/>
+              <a:t>Location</a:t>
+            </a:r>
           </a:p>
         </p:txBody>
       </p:sp>
@@ -6519,12 +6498,14 @@
           </a:p>
           <a:p>
             <a:r>
-              <a:rPr lang="en-US" sz="3200" dirty="0"/>
-              <a:t>S</a:t>
-            </a:r>
-            <a:r>
               <a:rPr lang="en-US" sz="3200" dirty="0" smtClean="0"/>
-              <a:t>ponsors</a:t>
+              <a:t>Sponsorship</a:t>
+            </a:r>
+          </a:p>
+          <a:p>
+            <a:r>
+              <a:rPr lang="en-US" sz="3200" dirty="0" smtClean="0"/>
+              <a:t>Extend Hangout Feature</a:t>
             </a:r>
             <a:endParaRPr lang="en-US" sz="3200" dirty="0"/>
           </a:p>

</xml_diff>